<commit_message>
v.1.3 total analysis created, piechart design changed
</commit_message>
<xml_diff>
--- a/results/01.2099 - wyniki/2099.01 - raport finansowy.pptx
+++ b/results/01.2099 - wyniki/2099.01 - raport finansowy.pptx
@@ -3172,7 +3172,7 @@
         </p:blipFill>
         <p:spPr>
           <a:xfrm>
-            <a:off x="1097280" y="0"/>
+            <a:off x="1371600" y="0"/>
             <a:ext cx="6858000" cy="6858000"/>
           </a:xfrm>
           <a:prstGeom prst="rect">
@@ -3214,7 +3214,7 @@
         </p:blipFill>
         <p:spPr>
           <a:xfrm>
-            <a:off x="1097280" y="0"/>
+            <a:off x="1371600" y="0"/>
             <a:ext cx="6858000" cy="6858000"/>
           </a:xfrm>
           <a:prstGeom prst="rect">
@@ -3256,7 +3256,7 @@
         </p:blipFill>
         <p:spPr>
           <a:xfrm>
-            <a:off x="1097280" y="0"/>
+            <a:off x="1371600" y="0"/>
             <a:ext cx="6858000" cy="6858000"/>
           </a:xfrm>
           <a:prstGeom prst="rect">
@@ -3298,7 +3298,7 @@
         </p:blipFill>
         <p:spPr>
           <a:xfrm>
-            <a:off x="1097280" y="0"/>
+            <a:off x="1371600" y="0"/>
             <a:ext cx="6858000" cy="6858000"/>
           </a:xfrm>
           <a:prstGeom prst="rect">
@@ -3340,7 +3340,7 @@
         </p:blipFill>
         <p:spPr>
           <a:xfrm>
-            <a:off x="1097280" y="0"/>
+            <a:off x="1371600" y="0"/>
             <a:ext cx="6858000" cy="6858000"/>
           </a:xfrm>
           <a:prstGeom prst="rect">
@@ -3382,7 +3382,7 @@
         </p:blipFill>
         <p:spPr>
           <a:xfrm>
-            <a:off x="1097280" y="0"/>
+            <a:off x="1371600" y="0"/>
             <a:ext cx="6858000" cy="6858000"/>
           </a:xfrm>
           <a:prstGeom prst="rect">
@@ -3424,7 +3424,7 @@
         </p:blipFill>
         <p:spPr>
           <a:xfrm>
-            <a:off x="1097280" y="0"/>
+            <a:off x="1371600" y="0"/>
             <a:ext cx="6858000" cy="6858000"/>
           </a:xfrm>
           <a:prstGeom prst="rect">
@@ -3466,7 +3466,7 @@
         </p:blipFill>
         <p:spPr>
           <a:xfrm>
-            <a:off x="1097280" y="0"/>
+            <a:off x="1371600" y="0"/>
             <a:ext cx="6858000" cy="6858000"/>
           </a:xfrm>
           <a:prstGeom prst="rect">

</xml_diff>